<commit_message>
Update Flight above the sky-00657024+00657037.pptx
</commit_message>
<xml_diff>
--- a/Flight above the sky-00657024+00657037.pptx
+++ b/Flight above the sky-00657024+00657037.pptx
@@ -3148,11 +3148,7 @@
         <a:p>
           <a:r>
             <a:rPr lang="zh-TW" altLang="en-US" sz="1800" dirty="0" smtClean="0"/>
-            <a:t>４種</a:t>
-          </a:r>
-          <a:r>
-            <a:rPr lang="zh-TW" altLang="en-US" sz="1800" dirty="0" smtClean="0"/>
-            <a:t>樂器  教學網頁</a:t>
+            <a:t>４種樂器  教學網頁</a:t>
           </a:r>
           <a:endParaRPr lang="zh-TW" altLang="en-US" sz="1800" dirty="0"/>
         </a:p>
@@ -6052,11 +6048,7 @@
           </a:pPr>
           <a:r>
             <a:rPr lang="zh-TW" altLang="en-US" sz="1800" kern="1200" dirty="0" smtClean="0"/>
-            <a:t>４種</a:t>
-          </a:r>
-          <a:r>
-            <a:rPr lang="zh-TW" altLang="en-US" sz="1800" kern="1200" dirty="0" smtClean="0"/>
-            <a:t>樂器  教學網頁</a:t>
+            <a:t>４種樂器  教學網頁</a:t>
           </a:r>
           <a:endParaRPr lang="zh-TW" altLang="en-US" sz="1800" kern="1200" dirty="0"/>
         </a:p>
@@ -11254,7 +11246,7 @@
             <a:fld id="{56815EFA-0D6A-46A4-B7E4-497E86EE12D0}" type="datetimeFigureOut">
               <a:rPr lang="zh-TW" altLang="en-US" smtClean="0"/>
               <a:pPr/>
-              <a:t>2019/1/7</a:t>
+              <a:t>2019/1/8</a:t>
             </a:fld>
             <a:endParaRPr lang="zh-TW" altLang="en-US"/>
           </a:p>
@@ -11653,7 +11645,7 @@
             <a:fld id="{5BBEAD13-0566-4C6C-97E7-55F17F24B09F}" type="datetimeFigureOut">
               <a:rPr lang="zh-TW" altLang="en-US" smtClean="0"/>
               <a:pPr/>
-              <a:t>2019/1/7</a:t>
+              <a:t>2019/1/8</a:t>
             </a:fld>
             <a:endParaRPr lang="zh-TW" altLang="en-US"/>
           </a:p>
@@ -11954,7 +11946,7 @@
             <a:fld id="{5BBEAD13-0566-4C6C-97E7-55F17F24B09F}" type="datetimeFigureOut">
               <a:rPr lang="zh-TW" altLang="en-US" smtClean="0"/>
               <a:pPr/>
-              <a:t>2019/1/7</a:t>
+              <a:t>2019/1/8</a:t>
             </a:fld>
             <a:endParaRPr lang="zh-TW" altLang="en-US"/>
           </a:p>
@@ -12131,7 +12123,7 @@
             <a:fld id="{5BBEAD13-0566-4C6C-97E7-55F17F24B09F}" type="datetimeFigureOut">
               <a:rPr lang="zh-TW" altLang="en-US" smtClean="0"/>
               <a:pPr/>
-              <a:t>2019/1/7</a:t>
+              <a:t>2019/1/8</a:t>
             </a:fld>
             <a:endParaRPr lang="zh-TW" altLang="en-US"/>
           </a:p>
@@ -12298,7 +12290,7 @@
             <a:fld id="{5BBEAD13-0566-4C6C-97E7-55F17F24B09F}" type="datetimeFigureOut">
               <a:rPr lang="zh-TW" altLang="en-US" smtClean="0"/>
               <a:pPr/>
-              <a:t>2019/1/7</a:t>
+              <a:t>2019/1/8</a:t>
             </a:fld>
             <a:endParaRPr lang="zh-TW" altLang="en-US"/>
           </a:p>
@@ -12560,7 +12552,7 @@
             <a:fld id="{5BBEAD13-0566-4C6C-97E7-55F17F24B09F}" type="datetimeFigureOut">
               <a:rPr lang="zh-TW" altLang="en-US" smtClean="0"/>
               <a:pPr/>
-              <a:t>2019/1/7</a:t>
+              <a:t>2019/1/8</a:t>
             </a:fld>
             <a:endParaRPr lang="zh-TW" altLang="en-US"/>
           </a:p>
@@ -13016,7 +13008,7 @@
             <a:fld id="{5BBEAD13-0566-4C6C-97E7-55F17F24B09F}" type="datetimeFigureOut">
               <a:rPr lang="zh-TW" altLang="en-US" smtClean="0"/>
               <a:pPr/>
-              <a:t>2019/1/7</a:t>
+              <a:t>2019/1/8</a:t>
             </a:fld>
             <a:endParaRPr lang="zh-TW" altLang="en-US"/>
           </a:p>
@@ -13501,7 +13493,7 @@
             <a:fld id="{5BBEAD13-0566-4C6C-97E7-55F17F24B09F}" type="datetimeFigureOut">
               <a:rPr lang="zh-TW" altLang="en-US" smtClean="0"/>
               <a:pPr/>
-              <a:t>2019/1/7</a:t>
+              <a:t>2019/1/8</a:t>
             </a:fld>
             <a:endParaRPr lang="zh-TW" altLang="en-US"/>
           </a:p>
@@ -13621,7 +13613,7 @@
             <a:fld id="{5BBEAD13-0566-4C6C-97E7-55F17F24B09F}" type="datetimeFigureOut">
               <a:rPr lang="zh-TW" altLang="en-US" smtClean="0"/>
               <a:pPr/>
-              <a:t>2019/1/7</a:t>
+              <a:t>2019/1/8</a:t>
             </a:fld>
             <a:endParaRPr lang="zh-TW" altLang="en-US"/>
           </a:p>
@@ -13759,7 +13751,7 @@
             <a:fld id="{5BBEAD13-0566-4C6C-97E7-55F17F24B09F}" type="datetimeFigureOut">
               <a:rPr lang="zh-TW" altLang="en-US" smtClean="0"/>
               <a:pPr/>
-              <a:t>2019/1/7</a:t>
+              <a:t>2019/1/8</a:t>
             </a:fld>
             <a:endParaRPr lang="zh-TW" altLang="en-US"/>
           </a:p>
@@ -14075,7 +14067,7 @@
             <a:fld id="{5BBEAD13-0566-4C6C-97E7-55F17F24B09F}" type="datetimeFigureOut">
               <a:rPr lang="zh-TW" altLang="en-US" smtClean="0"/>
               <a:pPr/>
-              <a:t>2019/1/7</a:t>
+              <a:t>2019/1/8</a:t>
             </a:fld>
             <a:endParaRPr lang="zh-TW" altLang="en-US"/>
           </a:p>
@@ -14205,7 +14197,7 @@
             <a:fld id="{5BBEAD13-0566-4C6C-97E7-55F17F24B09F}" type="datetimeFigureOut">
               <a:rPr lang="zh-TW" altLang="en-US" smtClean="0"/>
               <a:pPr/>
-              <a:t>2019/1/7</a:t>
+              <a:t>2019/1/8</a:t>
             </a:fld>
             <a:endParaRPr lang="zh-TW" altLang="en-US"/>
           </a:p>
@@ -14966,7 +14958,7 @@
             <a:fld id="{5BBEAD13-0566-4C6C-97E7-55F17F24B09F}" type="datetimeFigureOut">
               <a:rPr lang="zh-TW" altLang="en-US" smtClean="0"/>
               <a:pPr/>
-              <a:t>2019/1/7</a:t>
+              <a:t>2019/1/8</a:t>
             </a:fld>
             <a:endParaRPr lang="zh-TW" altLang="en-US"/>
           </a:p>
@@ -16037,7 +16029,14 @@
                 <a:latin typeface="微軟正黑體 Light" pitchFamily="34" charset="-120"/>
                 <a:ea typeface="微軟正黑體 Light" pitchFamily="34" charset="-120"/>
               </a:rPr>
-              <a:t>初始畫面（首頁）、</a:t>
+              <a:t>初始</a:t>
+            </a:r>
+            <a:r>
+              <a:rPr lang="zh-TW" altLang="en-US" b="1" dirty="0" smtClean="0">
+                <a:latin typeface="微軟正黑體 Light" pitchFamily="34" charset="-120"/>
+                <a:ea typeface="微軟正黑體 Light" pitchFamily="34" charset="-120"/>
+              </a:rPr>
+              <a:t>畫面、</a:t>
             </a:r>
             <a:r>
               <a:rPr lang="en-US" altLang="zh-TW" b="1" dirty="0" smtClean="0">

</xml_diff>